<commit_message>
MLOps - Course project presentation
</commit_message>
<xml_diff>
--- a/MLOps/42 - Course project/Course project.pptx
+++ b/MLOps/42 - Course project/Course project.pptx
@@ -9369,25 +9369,32 @@
               </a:spcBef>
             </a:pPr>
             <a:r>
+              <a:rPr lang="en-US" sz="1400" dirty="0">
+                <a:latin typeface="Calibri"/>
+                <a:cs typeface="Calibri"/>
+              </a:rPr>
+              <a:t>09</a:t>
+            </a:r>
+            <a:r>
+              <a:rPr sz="1400" dirty="0">
+                <a:latin typeface="Calibri"/>
+                <a:cs typeface="Calibri"/>
+              </a:rPr>
+              <a:t>.</a:t>
+            </a:r>
+            <a:r>
+              <a:rPr lang="en-US" sz="1400" dirty="0">
+                <a:latin typeface="Calibri"/>
+                <a:cs typeface="Calibri"/>
+              </a:rPr>
+              <a:t>1</a:t>
+            </a:r>
+            <a:r>
               <a:rPr lang="ru-RU" sz="1400" dirty="0">
                 <a:latin typeface="Calibri"/>
                 <a:cs typeface="Calibri"/>
               </a:rPr>
-              <a:t>10</a:t>
-            </a:r>
-            <a:r>
-              <a:rPr sz="1400" dirty="0">
-                <a:latin typeface="Calibri"/>
-                <a:cs typeface="Calibri"/>
-              </a:rPr>
-              <a:t>.</a:t>
-            </a:r>
-            <a:r>
-              <a:rPr lang="ru-RU" sz="1400" dirty="0">
-                <a:latin typeface="Calibri"/>
-                <a:cs typeface="Calibri"/>
-              </a:rPr>
-              <a:t>09</a:t>
+              <a:t>0</a:t>
             </a:r>
             <a:r>
               <a:rPr sz="1400" spc="-35" dirty="0">

</xml_diff>

<commit_message>
MLPro - PyToch optimizers
</commit_message>
<xml_diff>
--- a/MLOps/42 - Course project/Course project.pptx
+++ b/MLOps/42 - Course project/Course project.pptx
@@ -128,7 +128,7 @@
           <a:p>
             <a:fld id="{CED1C788-56A1-2E45-A024-5C42A74F7F0E}" type="datetimeFigureOut">
               <a:rPr lang="en-US" smtClean="0"/>
-              <a:t>8/8/24</a:t>
+              <a:t>10/3/24</a:t>
             </a:fld>
             <a:endParaRPr lang="en-US"/>
           </a:p>
@@ -1757,7 +1757,7 @@
           <a:p>
             <a:fld id="{1D8BD707-D9CF-40AE-B4C6-C98DA3205C09}" type="datetimeFigureOut">
               <a:rPr lang="en-US"/>
-              <a:t>8/8/24</a:t>
+              <a:t>10/3/24</a:t>
             </a:fld>
             <a:endParaRPr lang="en-US"/>
           </a:p>
@@ -1934,7 +1934,7 @@
           <a:p>
             <a:fld id="{1D8BD707-D9CF-40AE-B4C6-C98DA3205C09}" type="datetimeFigureOut">
               <a:rPr lang="en-US"/>
-              <a:t>8/8/24</a:t>
+              <a:t>10/3/24</a:t>
             </a:fld>
             <a:endParaRPr lang="en-US"/>
           </a:p>
@@ -2160,7 +2160,7 @@
           <a:p>
             <a:fld id="{1D8BD707-D9CF-40AE-B4C6-C98DA3205C09}" type="datetimeFigureOut">
               <a:rPr lang="en-US"/>
-              <a:t>8/8/24</a:t>
+              <a:t>10/3/24</a:t>
             </a:fld>
             <a:endParaRPr lang="en-US"/>
           </a:p>
@@ -2338,7 +2338,7 @@
           <a:p>
             <a:fld id="{1D8BD707-D9CF-40AE-B4C6-C98DA3205C09}" type="datetimeFigureOut">
               <a:rPr lang="en-US"/>
-              <a:t>8/8/24</a:t>
+              <a:t>10/3/24</a:t>
             </a:fld>
             <a:endParaRPr lang="en-US"/>
           </a:p>
@@ -2457,7 +2457,7 @@
           <a:p>
             <a:fld id="{1D8BD707-D9CF-40AE-B4C6-C98DA3205C09}" type="datetimeFigureOut">
               <a:rPr lang="en-US"/>
-              <a:t>8/8/24</a:t>
+              <a:t>10/3/24</a:t>
             </a:fld>
             <a:endParaRPr lang="en-US"/>
           </a:p>
@@ -4609,7 +4609,7 @@
           <a:p>
             <a:fld id="{1D8BD707-D9CF-40AE-B4C6-C98DA3205C09}" type="datetimeFigureOut">
               <a:rPr lang="en-US"/>
-              <a:t>8/8/24</a:t>
+              <a:t>10/3/24</a:t>
             </a:fld>
             <a:endParaRPr lang="en-US"/>
           </a:p>
@@ -9151,6 +9151,12 @@
             </a:pPr>
             <a:r>
               <a:rPr lang="ru-RU" sz="1400" dirty="0">
+                <a:solidFill>
+                  <a:schemeClr val="tx1">
+                    <a:lumMod val="65000"/>
+                    <a:lumOff val="35000"/>
+                  </a:schemeClr>
+                </a:solidFill>
                 <a:latin typeface="Calibri"/>
                 <a:cs typeface="Calibri"/>
               </a:rPr>
@@ -9158,6 +9164,12 @@
             </a:r>
             <a:r>
               <a:rPr sz="1400" dirty="0">
+                <a:solidFill>
+                  <a:schemeClr val="tx1">
+                    <a:lumMod val="65000"/>
+                    <a:lumOff val="35000"/>
+                  </a:schemeClr>
+                </a:solidFill>
                 <a:latin typeface="Calibri"/>
                 <a:cs typeface="Calibri"/>
               </a:rPr>
@@ -9165,6 +9177,12 @@
             </a:r>
             <a:r>
               <a:rPr lang="ru-RU" sz="1400" dirty="0">
+                <a:solidFill>
+                  <a:schemeClr val="tx1">
+                    <a:lumMod val="65000"/>
+                    <a:lumOff val="35000"/>
+                  </a:schemeClr>
+                </a:solidFill>
                 <a:latin typeface="Calibri"/>
                 <a:cs typeface="Calibri"/>
               </a:rPr>
@@ -9172,6 +9190,12 @@
             </a:r>
             <a:r>
               <a:rPr sz="1400" spc="-40" dirty="0">
+                <a:solidFill>
+                  <a:schemeClr val="tx1">
+                    <a:lumMod val="65000"/>
+                    <a:lumOff val="35000"/>
+                  </a:schemeClr>
+                </a:solidFill>
                 <a:latin typeface="Calibri"/>
                 <a:cs typeface="Calibri"/>
               </a:rPr>
@@ -9179,12 +9203,24 @@
             </a:r>
             <a:r>
               <a:rPr sz="1400" spc="-50" dirty="0">
+                <a:solidFill>
+                  <a:schemeClr val="tx1">
+                    <a:lumMod val="65000"/>
+                    <a:lumOff val="35000"/>
+                  </a:schemeClr>
+                </a:solidFill>
                 <a:latin typeface="Calibri"/>
                 <a:cs typeface="Calibri"/>
               </a:rPr>
               <a:t>-</a:t>
             </a:r>
             <a:endParaRPr sz="1400" dirty="0">
+              <a:solidFill>
+                <a:schemeClr val="tx1">
+                  <a:lumMod val="65000"/>
+                  <a:lumOff val="35000"/>
+                </a:schemeClr>
+              </a:solidFill>
               <a:latin typeface="Calibri"/>
               <a:cs typeface="Calibri"/>
             </a:endParaRPr>
@@ -9221,11 +9257,11 @@
               </a:spcBef>
             </a:pPr>
             <a:r>
-              <a:rPr lang="ru-RU" sz="1400" dirty="0">
+              <a:rPr lang="en-US" sz="1400" dirty="0">
                 <a:latin typeface="Calibri"/>
                 <a:cs typeface="Calibri"/>
               </a:rPr>
-              <a:t>27</a:t>
+              <a:t>03</a:t>
             </a:r>
             <a:r>
               <a:rPr sz="1400" dirty="0">
@@ -9235,11 +9271,11 @@
               <a:t>.</a:t>
             </a:r>
             <a:r>
-              <a:rPr lang="ru-RU" sz="1400" dirty="0">
+              <a:rPr lang="en-US" sz="1400" dirty="0">
                 <a:latin typeface="Calibri"/>
                 <a:cs typeface="Calibri"/>
               </a:rPr>
-              <a:t>08</a:t>
+              <a:t>10</a:t>
             </a:r>
             <a:r>
               <a:rPr sz="1400" spc="-35" dirty="0">
@@ -9296,7 +9332,14 @@
                 <a:latin typeface="Calibri"/>
                 <a:cs typeface="Calibri"/>
               </a:rPr>
-              <a:t>04</a:t>
+              <a:t>0</a:t>
+            </a:r>
+            <a:r>
+              <a:rPr lang="en-US" sz="1400" dirty="0">
+                <a:latin typeface="Calibri"/>
+                <a:cs typeface="Calibri"/>
+              </a:rPr>
+              <a:t>9</a:t>
             </a:r>
             <a:r>
               <a:rPr sz="1400" dirty="0">
@@ -9306,11 +9349,11 @@
               <a:t>.</a:t>
             </a:r>
             <a:r>
-              <a:rPr lang="ru-RU" sz="1400" dirty="0">
+              <a:rPr lang="en-US" sz="1400" dirty="0">
                 <a:latin typeface="Calibri"/>
                 <a:cs typeface="Calibri"/>
               </a:rPr>
-              <a:t>09</a:t>
+              <a:t>10</a:t>
             </a:r>
             <a:r>
               <a:rPr sz="1400" spc="-35" dirty="0">
@@ -9373,7 +9416,7 @@
                 <a:latin typeface="Calibri"/>
                 <a:cs typeface="Calibri"/>
               </a:rPr>
-              <a:t>09</a:t>
+              <a:t>11</a:t>
             </a:r>
             <a:r>
               <a:rPr sz="1400" dirty="0">
@@ -9657,6 +9700,14 @@
           <a:ln>
             <a:noFill/>
           </a:ln>
+          <a:effectLst>
+            <a:glow rad="139700">
+              <a:schemeClr val="accent1">
+                <a:satMod val="175000"/>
+                <a:alpha val="40000"/>
+              </a:schemeClr>
+            </a:glow>
+          </a:effectLst>
         </p:spPr>
         <p:style>
           <a:lnRef idx="2">
@@ -9711,7 +9762,9 @@
             <a:avLst/>
           </a:prstGeom>
           <a:solidFill>
-            <a:srgbClr val="FFD966"/>
+            <a:schemeClr val="bg1">
+              <a:lumMod val="85000"/>
+            </a:schemeClr>
           </a:solidFill>
           <a:ln>
             <a:noFill/>
@@ -9741,7 +9794,10 @@
             <a:r>
               <a:rPr lang="ru-RU" sz="1400" dirty="0">
                 <a:solidFill>
-                  <a:schemeClr val="tx1"/>
+                  <a:schemeClr val="tx1">
+                    <a:lumMod val="65000"/>
+                    <a:lumOff val="35000"/>
+                  </a:schemeClr>
                 </a:solidFill>
               </a:rPr>
               <a:t>Выбор темы и организация проектной работы</a:t>

</xml_diff>